<commit_message>
Added JDoc comments to all classes except Block class.
</commit_message>
<xml_diff>
--- a/src/APPT.pptx
+++ b/src/APPT.pptx
@@ -110,6 +110,11 @@
       </a:defRPr>
     </a:lvl9pPr>
   </p:defaultTextStyle>
+  <p:extLst>
+    <p:ext uri="{EFAFB233-063F-42B5-8137-9DF3F51BA10A}">
+      <p15:sldGuideLst xmlns:p15="http://schemas.microsoft.com/office/powerpoint/2012/main"/>
+    </p:ext>
+  </p:extLst>
 </p:presentation>
 </file>
 
@@ -195,7 +200,7 @@
           <a:p>
             <a:fld id="{BB81F716-993F-4AB5-9B94-DF555B2379CF}" type="datetimeFigureOut">
               <a:rPr lang="en-IN" smtClean="0"/>
-              <a:t>02-12-2018</a:t>
+              <a:t>02/12/18</a:t>
             </a:fld>
             <a:endParaRPr lang="en-IN"/>
           </a:p>
@@ -612,7 +617,7 @@
           <a:p>
             <a:fld id="{1964C4EF-0AA6-4C3F-8306-5B85966F5A21}" type="datetime1">
               <a:rPr lang="en-IN" smtClean="0"/>
-              <a:t>02-12-2018</a:t>
+              <a:t>02/12/18</a:t>
             </a:fld>
             <a:endParaRPr lang="en-IN"/>
           </a:p>
@@ -815,7 +820,7 @@
           <a:p>
             <a:fld id="{0D4A0B7A-7DBA-480B-B102-9792BA857AE6}" type="datetime1">
               <a:rPr lang="en-IN" smtClean="0"/>
-              <a:t>02-12-2018</a:t>
+              <a:t>02/12/18</a:t>
             </a:fld>
             <a:endParaRPr lang="en-IN"/>
           </a:p>
@@ -1028,7 +1033,7 @@
           <a:p>
             <a:fld id="{D67AF276-66CE-4F05-BF42-368E83101A1E}" type="datetime1">
               <a:rPr lang="en-IN" smtClean="0"/>
-              <a:t>02-12-2018</a:t>
+              <a:t>02/12/18</a:t>
             </a:fld>
             <a:endParaRPr lang="en-IN"/>
           </a:p>
@@ -1231,7 +1236,7 @@
           <a:p>
             <a:fld id="{0D9DB3F7-1A4B-44B5-9FC6-F4D8E235EC53}" type="datetime1">
               <a:rPr lang="en-IN" smtClean="0"/>
-              <a:t>02-12-2018</a:t>
+              <a:t>02/12/18</a:t>
             </a:fld>
             <a:endParaRPr lang="en-IN"/>
           </a:p>
@@ -1510,7 +1515,7 @@
           <a:p>
             <a:fld id="{EE0EBAE7-20D0-429F-BFF8-035213F27C6D}" type="datetime1">
               <a:rPr lang="en-IN" smtClean="0"/>
-              <a:t>02-12-2018</a:t>
+              <a:t>02/12/18</a:t>
             </a:fld>
             <a:endParaRPr lang="en-IN"/>
           </a:p>
@@ -1781,7 +1786,7 @@
           <a:p>
             <a:fld id="{37FF801C-8C39-4B4F-8091-5F6888E394B7}" type="datetime1">
               <a:rPr lang="en-IN" smtClean="0"/>
-              <a:t>02-12-2018</a:t>
+              <a:t>02/12/18</a:t>
             </a:fld>
             <a:endParaRPr lang="en-IN"/>
           </a:p>
@@ -2199,7 +2204,7 @@
           <a:p>
             <a:fld id="{74571798-18F5-4B45-B44F-1F0D969C850A}" type="datetime1">
               <a:rPr lang="en-IN" smtClean="0"/>
-              <a:t>02-12-2018</a:t>
+              <a:t>02/12/18</a:t>
             </a:fld>
             <a:endParaRPr lang="en-IN"/>
           </a:p>
@@ -2344,7 +2349,7 @@
           <a:p>
             <a:fld id="{88D72392-4597-424C-AE05-A0E42D8B941B}" type="datetime1">
               <a:rPr lang="en-IN" smtClean="0"/>
-              <a:t>02-12-2018</a:t>
+              <a:t>02/12/18</a:t>
             </a:fld>
             <a:endParaRPr lang="en-IN"/>
           </a:p>
@@ -2460,7 +2465,7 @@
           <a:p>
             <a:fld id="{C907388A-8432-492A-8444-BA086C602AD0}" type="datetime1">
               <a:rPr lang="en-IN" smtClean="0"/>
-              <a:t>02-12-2018</a:t>
+              <a:t>02/12/18</a:t>
             </a:fld>
             <a:endParaRPr lang="en-IN"/>
           </a:p>
@@ -2776,7 +2781,7 @@
           <a:p>
             <a:fld id="{034768E4-31E3-4E6B-B466-59EC55C07A1B}" type="datetime1">
               <a:rPr lang="en-IN" smtClean="0"/>
-              <a:t>02-12-2018</a:t>
+              <a:t>02/12/18</a:t>
             </a:fld>
             <a:endParaRPr lang="en-IN"/>
           </a:p>
@@ -3068,7 +3073,7 @@
           <a:p>
             <a:fld id="{317ED43F-8FD7-48A4-9A60-DB5F24E5561F}" type="datetime1">
               <a:rPr lang="en-IN" smtClean="0"/>
-              <a:t>02-12-2018</a:t>
+              <a:t>02/12/18</a:t>
             </a:fld>
             <a:endParaRPr lang="en-IN"/>
           </a:p>
@@ -3314,7 +3319,7 @@
           <a:p>
             <a:fld id="{7C6A90DA-DC60-4C96-9FCA-93C4DC5BE4A2}" type="datetime1">
               <a:rPr lang="en-IN" smtClean="0"/>
-              <a:t>02-12-2018</a:t>
+              <a:t>02/12/18</a:t>
             </a:fld>
             <a:endParaRPr lang="en-IN"/>
           </a:p>
@@ -4320,7 +4325,7 @@
           <a:p>
             <a:r>
               <a:rPr lang="en-US" dirty="0"/>
-              <a:t>Main menu, Leaderboards, Store, Resume game and Profile and their functionalities.</a:t>
+              <a:t>All Static GUI components.</a:t>
             </a:r>
           </a:p>
           <a:p>
@@ -4394,9 +4399,20 @@
           <a:p>
             <a:r>
               <a:rPr lang="en-US" dirty="0"/>
-              <a:t>The actual gameplay and its functionalities.</a:t>
-            </a:r>
-            <a:endParaRPr lang="en-IN" dirty="0"/>
+              <a:t>All animation related components. </a:t>
+            </a:r>
+          </a:p>
+          <a:p>
+            <a:r>
+              <a:rPr lang="en-US" dirty="0"/>
+              <a:t>All logic for gameplay.</a:t>
+            </a:r>
+          </a:p>
+          <a:p>
+            <a:r>
+              <a:rPr lang="en-US" dirty="0"/>
+              <a:t>Serialization-Deserialization</a:t>
+            </a:r>
           </a:p>
         </p:txBody>
       </p:sp>

</xml_diff>